<commit_message>
Update info and .pptx.
</commit_message>
<xml_diff>
--- a/Misc/Linux_programming_environment_tools.pptx
+++ b/Misc/Linux_programming_environment_tools.pptx
@@ -35695,6 +35695,41 @@
             </a:r>
           </a:p>
           <a:p>
+            <a:r>
+              <a:rPr lang="en-US" altLang="zh-CN" dirty="0" smtClean="0"/>
+              <a:t>My </a:t>
+            </a:r>
+            <a:r>
+              <a:rPr lang="en-US" altLang="zh-CN" dirty="0" err="1" smtClean="0"/>
+              <a:t>git</a:t>
+            </a:r>
+            <a:r>
+              <a:rPr lang="en-US" altLang="zh-CN" dirty="0"/>
+              <a:t> : https://</a:t>
+            </a:r>
+            <a:r>
+              <a:rPr lang="en-US" altLang="zh-CN" dirty="0" err="1"/>
+              <a:t>github.com</a:t>
+            </a:r>
+            <a:r>
+              <a:rPr lang="en-US" altLang="zh-CN" dirty="0"/>
+              <a:t>/</a:t>
+            </a:r>
+            <a:r>
+              <a:rPr lang="en-US" altLang="zh-CN" dirty="0" err="1"/>
+              <a:t>ivanchenhz</a:t>
+            </a:r>
+            <a:r>
+              <a:rPr lang="en-US" altLang="zh-CN" dirty="0"/>
+              <a:t>/</a:t>
+            </a:r>
+            <a:r>
+              <a:rPr lang="en-US" altLang="zh-CN" dirty="0" err="1"/>
+              <a:t>IvanChenGit.git</a:t>
+            </a:r>
+            <a:endParaRPr lang="en-US" dirty="0" smtClean="0"/>
+          </a:p>
+          <a:p>
             <a:endParaRPr lang="en-US" dirty="0"/>
           </a:p>
         </p:txBody>
@@ -35939,13 +35974,8 @@
           <a:p>
             <a:r>
               <a:rPr lang="en-US" dirty="0" smtClean="0"/>
-              <a:t>Say hello to Linux programming </a:t>
+              <a:t>Say hello to Linux programming environment.</a:t>
             </a:r>
-            <a:r>
-              <a:rPr lang="en-US" dirty="0" smtClean="0"/>
-              <a:t>environment.</a:t>
-            </a:r>
-            <a:endParaRPr lang="en-US" dirty="0" smtClean="0"/>
           </a:p>
           <a:p>
             <a:endParaRPr lang="en-US" dirty="0"/>

</xml_diff>